<commit_message>
make footnotes as subscript
</commit_message>
<xml_diff>
--- a/powerpoints/gabarit_mod.pptx
+++ b/powerpoints/gabarit_mod.pptx
@@ -232,7 +232,7 @@
             <a:fld id="{FDCA904F-AFE4-4F4A-AA13-CC2FD407ABB0}" type="datetimeFigureOut">
               <a:rPr lang="fr-CA" smtClean="0"/>
               <a:pPr/>
-              <a:t>2023-06-20</a:t>
+              <a:t>2023-06-21</a:t>
             </a:fld>
             <a:endParaRPr lang="fr-CA" dirty="0"/>
           </a:p>
@@ -1616,7 +1616,7 @@
             <a:fld id="{FDCA904F-AFE4-4F4A-AA13-CC2FD407ABB0}" type="datetimeFigureOut">
               <a:rPr lang="fr-CA" smtClean="0"/>
               <a:pPr/>
-              <a:t>2023-06-20</a:t>
+              <a:t>2023-06-21</a:t>
             </a:fld>
             <a:endParaRPr lang="fr-CA" dirty="0"/>
           </a:p>
@@ -2284,10 +2284,9 @@
           </a:lstStyle>
           <a:p>
             <a:r>
-              <a:rPr lang="fr-CA"/>
-              <a:t>banner</a:t>
-            </a:r>
-            <a:endParaRPr lang="fr-CA" dirty="0"/>
+              <a:rPr lang="fr-CA" dirty="0"/>
+              <a:t>&lt;banner&gt;</a:t>
+            </a:r>
           </a:p>
         </p:txBody>
       </p:sp>
@@ -2344,7 +2343,7 @@
           <a:p>
             <a:r>
               <a:rPr lang="fr-CA" dirty="0"/>
-              <a:t>banner</a:t>
+              <a:t>&lt;banner&gt;</a:t>
             </a:r>
           </a:p>
         </p:txBody>
@@ -2656,12 +2655,14 @@
 </file>
 
 <file path=customXml/item1.xml><?xml version="1.0" encoding="utf-8"?>
-<?mso-contentType ?>
-<FormTemplates xmlns="http://schemas.microsoft.com/sharepoint/v3/contenttype/forms">
-  <Display>DocumentLibraryForm</Display>
-  <Edit>DocumentLibraryForm</Edit>
-  <New>DocumentLibraryForm</New>
-</FormTemplates>
+<p:properties xmlns:p="http://schemas.microsoft.com/office/2006/metadata/properties" xmlns:xsi="http://www.w3.org/2001/XMLSchema-instance" xmlns:pc="http://schemas.microsoft.com/office/infopath/2007/PartnerControls">
+  <documentManagement>
+    <lcf76f155ced4ddcb4097134ff3c332f xmlns="81c9f6d7-38be-4b6f-ac7a-53278e4778cd">
+      <Terms xmlns="http://schemas.microsoft.com/office/infopath/2007/PartnerControls"/>
+    </lcf76f155ced4ddcb4097134ff3c332f>
+    <TaxCatchAll xmlns="562370e7-b28b-48b8-b232-8034dde365ed" xsi:nil="true"/>
+  </documentManagement>
+</p:properties>
 </file>
 
 <file path=customXml/item2.xml><?xml version="1.0" encoding="utf-8"?>
@@ -2902,20 +2903,27 @@
 </file>
 
 <file path=customXml/item3.xml><?xml version="1.0" encoding="utf-8"?>
-<p:properties xmlns:p="http://schemas.microsoft.com/office/2006/metadata/properties" xmlns:xsi="http://www.w3.org/2001/XMLSchema-instance" xmlns:pc="http://schemas.microsoft.com/office/infopath/2007/PartnerControls">
-  <documentManagement>
-    <lcf76f155ced4ddcb4097134ff3c332f xmlns="81c9f6d7-38be-4b6f-ac7a-53278e4778cd">
-      <Terms xmlns="http://schemas.microsoft.com/office/infopath/2007/PartnerControls"/>
-    </lcf76f155ced4ddcb4097134ff3c332f>
-    <TaxCatchAll xmlns="562370e7-b28b-48b8-b232-8034dde365ed" xsi:nil="true"/>
-  </documentManagement>
-</p:properties>
+<?mso-contentType ?>
+<FormTemplates xmlns="http://schemas.microsoft.com/sharepoint/v3/contenttype/forms">
+  <Display>DocumentLibraryForm</Display>
+  <Edit>DocumentLibraryForm</Edit>
+  <New>DocumentLibraryForm</New>
+</FormTemplates>
 </file>
 
 <file path=customXml/itemProps1.xml><?xml version="1.0" encoding="utf-8"?>
-<ds:datastoreItem xmlns:ds="http://schemas.openxmlformats.org/officeDocument/2006/customXml" ds:itemID="{4E8F74D5-47AA-4DAD-A3A5-90C8113106BE}">
+<ds:datastoreItem xmlns:ds="http://schemas.openxmlformats.org/officeDocument/2006/customXml" ds:itemID="{AB088F19-0CAF-4A60-81E5-18DF993328EF}">
   <ds:schemaRefs>
-    <ds:schemaRef ds:uri="http://schemas.microsoft.com/sharepoint/v3/contenttype/forms"/>
+    <ds:schemaRef ds:uri="http://schemas.microsoft.com/office/2006/metadata/properties"/>
+    <ds:schemaRef ds:uri="http://schemas.openxmlformats.org/package/2006/metadata/core-properties"/>
+    <ds:schemaRef ds:uri="http://schemas.microsoft.com/office/2006/documentManagement/types"/>
+    <ds:schemaRef ds:uri="http://schemas.microsoft.com/office/infopath/2007/PartnerControls"/>
+    <ds:schemaRef ds:uri="http://purl.org/dc/terms/"/>
+    <ds:schemaRef ds:uri="http://purl.org/dc/elements/1.1/"/>
+    <ds:schemaRef ds:uri="http://purl.org/dc/dcmitype/"/>
+    <ds:schemaRef ds:uri="562370e7-b28b-48b8-b232-8034dde365ed"/>
+    <ds:schemaRef ds:uri="81c9f6d7-38be-4b6f-ac7a-53278e4778cd"/>
+    <ds:schemaRef ds:uri="http://www.w3.org/XML/1998/namespace"/>
   </ds:schemaRefs>
 </ds:datastoreItem>
 </file>
@@ -2940,18 +2948,9 @@
 </file>
 
 <file path=customXml/itemProps3.xml><?xml version="1.0" encoding="utf-8"?>
-<ds:datastoreItem xmlns:ds="http://schemas.openxmlformats.org/officeDocument/2006/customXml" ds:itemID="{AB088F19-0CAF-4A60-81E5-18DF993328EF}">
+<ds:datastoreItem xmlns:ds="http://schemas.openxmlformats.org/officeDocument/2006/customXml" ds:itemID="{4E8F74D5-47AA-4DAD-A3A5-90C8113106BE}">
   <ds:schemaRefs>
-    <ds:schemaRef ds:uri="http://schemas.microsoft.com/office/2006/metadata/properties"/>
-    <ds:schemaRef ds:uri="http://schemas.openxmlformats.org/package/2006/metadata/core-properties"/>
-    <ds:schemaRef ds:uri="http://schemas.microsoft.com/office/2006/documentManagement/types"/>
-    <ds:schemaRef ds:uri="http://schemas.microsoft.com/office/infopath/2007/PartnerControls"/>
-    <ds:schemaRef ds:uri="http://purl.org/dc/terms/"/>
-    <ds:schemaRef ds:uri="http://purl.org/dc/elements/1.1/"/>
-    <ds:schemaRef ds:uri="http://purl.org/dc/dcmitype/"/>
-    <ds:schemaRef ds:uri="562370e7-b28b-48b8-b232-8034dde365ed"/>
-    <ds:schemaRef ds:uri="81c9f6d7-38be-4b6f-ac7a-53278e4778cd"/>
-    <ds:schemaRef ds:uri="http://www.w3.org/XML/1998/namespace"/>
+    <ds:schemaRef ds:uri="http://schemas.microsoft.com/sharepoint/v3/contenttype/forms"/>
   </ds:schemaRefs>
 </ds:datastoreItem>
 </file>
</xml_diff>

<commit_message>
add title & subtitle
</commit_message>
<xml_diff>
--- a/powerpoints/gabarit_mod.pptx
+++ b/powerpoints/gabarit_mod.pptx
@@ -232,7 +232,7 @@
             <a:fld id="{FDCA904F-AFE4-4F4A-AA13-CC2FD407ABB0}" type="datetimeFigureOut">
               <a:rPr lang="fr-CA" smtClean="0"/>
               <a:pPr/>
-              <a:t>2023-06-21</a:t>
+              <a:t>2023-06-28</a:t>
             </a:fld>
             <a:endParaRPr lang="fr-CA" dirty="0"/>
           </a:p>
@@ -1616,7 +1616,7 @@
             <a:fld id="{FDCA904F-AFE4-4F4A-AA13-CC2FD407ABB0}" type="datetimeFigureOut">
               <a:rPr lang="fr-CA" smtClean="0"/>
               <a:pPr/>
-              <a:t>2023-06-21</a:t>
+              <a:t>2023-06-28</a:t>
             </a:fld>
             <a:endParaRPr lang="fr-CA" dirty="0"/>
           </a:p>
@@ -2075,13 +2075,16 @@
           <a:p>
             <a:r>
               <a:rPr lang="fr-CA" sz="2000" dirty="0"/>
-              <a:t>Titre </a:t>
-            </a:r>
-            <a:r>
-              <a:rPr lang="fr-CA" sz="2000"/>
-              <a:t>de l’article</a:t>
-            </a:r>
-            <a:endParaRPr lang="fr-CA" sz="2000" dirty="0"/>
+              <a:t>&lt;</a:t>
+            </a:r>
+            <a:r>
+              <a:rPr lang="fr-CA" sz="2000" dirty="0" err="1"/>
+              <a:t>title</a:t>
+            </a:r>
+            <a:r>
+              <a:rPr lang="fr-CA" sz="2000" dirty="0"/>
+              <a:t>&gt;</a:t>
+            </a:r>
           </a:p>
         </p:txBody>
       </p:sp>
@@ -2137,7 +2140,15 @@
           <a:p>
             <a:r>
               <a:rPr lang="fr-CA" sz="1100" dirty="0"/>
-              <a:t>Sous-titre</a:t>
+              <a:t>&lt;</a:t>
+            </a:r>
+            <a:r>
+              <a:rPr lang="fr-CA" sz="1100" dirty="0" err="1"/>
+              <a:t>subtitle</a:t>
+            </a:r>
+            <a:r>
+              <a:rPr lang="fr-CA" sz="1100" dirty="0"/>
+              <a:t>&gt;</a:t>
             </a:r>
           </a:p>
         </p:txBody>
@@ -2655,17 +2666,6 @@
 </file>
 
 <file path=customXml/item1.xml><?xml version="1.0" encoding="utf-8"?>
-<p:properties xmlns:p="http://schemas.microsoft.com/office/2006/metadata/properties" xmlns:xsi="http://www.w3.org/2001/XMLSchema-instance" xmlns:pc="http://schemas.microsoft.com/office/infopath/2007/PartnerControls">
-  <documentManagement>
-    <lcf76f155ced4ddcb4097134ff3c332f xmlns="81c9f6d7-38be-4b6f-ac7a-53278e4778cd">
-      <Terms xmlns="http://schemas.microsoft.com/office/infopath/2007/PartnerControls"/>
-    </lcf76f155ced4ddcb4097134ff3c332f>
-    <TaxCatchAll xmlns="562370e7-b28b-48b8-b232-8034dde365ed" xsi:nil="true"/>
-  </documentManagement>
-</p:properties>
-</file>
-
-<file path=customXml/item2.xml><?xml version="1.0" encoding="utf-8"?>
 <ct:contentTypeSchema xmlns:ct="http://schemas.microsoft.com/office/2006/metadata/contentType" xmlns:ma="http://schemas.microsoft.com/office/2006/metadata/properties/metaAttributes" ct:_="" ma:_="" ma:contentTypeName="Document" ma:contentTypeID="0x010100502947A9A1BFB64E940A6360D3C2E9FF" ma:contentTypeVersion="15" ma:contentTypeDescription="Crée un document." ma:contentTypeScope="" ma:versionID="ab003bcfa122b52dea7dac2dc4c56070">
   <xsd:schema xmlns:xsd="http://www.w3.org/2001/XMLSchema" xmlns:xs="http://www.w3.org/2001/XMLSchema" xmlns:p="http://schemas.microsoft.com/office/2006/metadata/properties" xmlns:ns2="81c9f6d7-38be-4b6f-ac7a-53278e4778cd" xmlns:ns3="562370e7-b28b-48b8-b232-8034dde365ed" targetNamespace="http://schemas.microsoft.com/office/2006/metadata/properties" ma:root="true" ma:fieldsID="55310cbb28621703c25a0ab43cf87825" ns2:_="" ns3:_="">
     <xsd:import namespace="81c9f6d7-38be-4b6f-ac7a-53278e4778cd"/>
@@ -2902,6 +2902,17 @@
 </ct:contentTypeSchema>
 </file>
 
+<file path=customXml/item2.xml><?xml version="1.0" encoding="utf-8"?>
+<p:properties xmlns:p="http://schemas.microsoft.com/office/2006/metadata/properties" xmlns:xsi="http://www.w3.org/2001/XMLSchema-instance" xmlns:pc="http://schemas.microsoft.com/office/infopath/2007/PartnerControls">
+  <documentManagement>
+    <lcf76f155ced4ddcb4097134ff3c332f xmlns="81c9f6d7-38be-4b6f-ac7a-53278e4778cd">
+      <Terms xmlns="http://schemas.microsoft.com/office/infopath/2007/PartnerControls"/>
+    </lcf76f155ced4ddcb4097134ff3c332f>
+    <TaxCatchAll xmlns="562370e7-b28b-48b8-b232-8034dde365ed" xsi:nil="true"/>
+  </documentManagement>
+</p:properties>
+</file>
+
 <file path=customXml/item3.xml><?xml version="1.0" encoding="utf-8"?>
 <?mso-contentType ?>
 <FormTemplates xmlns="http://schemas.microsoft.com/sharepoint/v3/contenttype/forms">
@@ -2912,23 +2923,6 @@
 </file>
 
 <file path=customXml/itemProps1.xml><?xml version="1.0" encoding="utf-8"?>
-<ds:datastoreItem xmlns:ds="http://schemas.openxmlformats.org/officeDocument/2006/customXml" ds:itemID="{AB088F19-0CAF-4A60-81E5-18DF993328EF}">
-  <ds:schemaRefs>
-    <ds:schemaRef ds:uri="http://schemas.microsoft.com/office/2006/metadata/properties"/>
-    <ds:schemaRef ds:uri="http://schemas.openxmlformats.org/package/2006/metadata/core-properties"/>
-    <ds:schemaRef ds:uri="http://schemas.microsoft.com/office/2006/documentManagement/types"/>
-    <ds:schemaRef ds:uri="http://schemas.microsoft.com/office/infopath/2007/PartnerControls"/>
-    <ds:schemaRef ds:uri="http://purl.org/dc/terms/"/>
-    <ds:schemaRef ds:uri="http://purl.org/dc/elements/1.1/"/>
-    <ds:schemaRef ds:uri="http://purl.org/dc/dcmitype/"/>
-    <ds:schemaRef ds:uri="562370e7-b28b-48b8-b232-8034dde365ed"/>
-    <ds:schemaRef ds:uri="81c9f6d7-38be-4b6f-ac7a-53278e4778cd"/>
-    <ds:schemaRef ds:uri="http://www.w3.org/XML/1998/namespace"/>
-  </ds:schemaRefs>
-</ds:datastoreItem>
-</file>
-
-<file path=customXml/itemProps2.xml><?xml version="1.0" encoding="utf-8"?>
 <ds:datastoreItem xmlns:ds="http://schemas.openxmlformats.org/officeDocument/2006/customXml" ds:itemID="{11065811-FE0D-4D15-8CA7-D9C0C1B9452F}">
   <ds:schemaRefs>
     <ds:schemaRef ds:uri="http://schemas.microsoft.com/office/2006/metadata/contentType"/>
@@ -2947,6 +2941,23 @@
 </ds:datastoreItem>
 </file>
 
+<file path=customXml/itemProps2.xml><?xml version="1.0" encoding="utf-8"?>
+<ds:datastoreItem xmlns:ds="http://schemas.openxmlformats.org/officeDocument/2006/customXml" ds:itemID="{AB088F19-0CAF-4A60-81E5-18DF993328EF}">
+  <ds:schemaRefs>
+    <ds:schemaRef ds:uri="http://schemas.microsoft.com/office/2006/metadata/properties"/>
+    <ds:schemaRef ds:uri="http://schemas.openxmlformats.org/package/2006/metadata/core-properties"/>
+    <ds:schemaRef ds:uri="http://schemas.microsoft.com/office/2006/documentManagement/types"/>
+    <ds:schemaRef ds:uri="http://schemas.microsoft.com/office/infopath/2007/PartnerControls"/>
+    <ds:schemaRef ds:uri="http://purl.org/dc/terms/"/>
+    <ds:schemaRef ds:uri="http://purl.org/dc/elements/1.1/"/>
+    <ds:schemaRef ds:uri="http://purl.org/dc/dcmitype/"/>
+    <ds:schemaRef ds:uri="562370e7-b28b-48b8-b232-8034dde365ed"/>
+    <ds:schemaRef ds:uri="81c9f6d7-38be-4b6f-ac7a-53278e4778cd"/>
+    <ds:schemaRef ds:uri="http://www.w3.org/XML/1998/namespace"/>
+  </ds:schemaRefs>
+</ds:datastoreItem>
+</file>
+
 <file path=customXml/itemProps3.xml><?xml version="1.0" encoding="utf-8"?>
 <ds:datastoreItem xmlns:ds="http://schemas.openxmlformats.org/officeDocument/2006/customXml" ds:itemID="{4E8F74D5-47AA-4DAD-A3A5-90C8113106BE}">
   <ds:schemaRefs>

</xml_diff>

<commit_message>
correctly add sources to the end
</commit_message>
<xml_diff>
--- a/powerpoints/gabarit_mod.pptx
+++ b/powerpoints/gabarit_mod.pptx
@@ -232,7 +232,7 @@
             <a:fld id="{FDCA904F-AFE4-4F4A-AA13-CC2FD407ABB0}" type="datetimeFigureOut">
               <a:rPr lang="fr-CA" smtClean="0"/>
               <a:pPr/>
-              <a:t>2023-06-28</a:t>
+              <a:t>2023-07-09</a:t>
             </a:fld>
             <a:endParaRPr lang="fr-CA" dirty="0"/>
           </a:p>
@@ -1616,7 +1616,7 @@
             <a:fld id="{FDCA904F-AFE4-4F4A-AA13-CC2FD407ABB0}" type="datetimeFigureOut">
               <a:rPr lang="fr-CA" smtClean="0"/>
               <a:pPr/>
-              <a:t>2023-06-28</a:t>
+              <a:t>2023-07-09</a:t>
             </a:fld>
             <a:endParaRPr lang="fr-CA" dirty="0"/>
           </a:p>
@@ -2336,7 +2336,7 @@
           <p:cNvPr id="2" name="Titre 1">
             <a:extLst>
               <a:ext uri="{FF2B5EF4-FFF2-40B4-BE49-F238E27FC236}">
-                <a16:creationId xmlns:a16="http://schemas.microsoft.com/office/drawing/2014/main" id="{486D4E87-2BC6-989D-C31B-C94C23654F8A}"/>
+                <a16:creationId xmlns:a16="http://schemas.microsoft.com/office/drawing/2014/main" id="{0EB308C9-B187-9F32-110B-1A1B89D3DD46}"/>
               </a:ext>
             </a:extLst>
           </p:cNvPr>
@@ -2353,16 +2353,1461 @@
           <a:lstStyle/>
           <a:p>
             <a:r>
-              <a:rPr lang="fr-CA" dirty="0"/>
-              <a:t>&lt;banner&gt;</a:t>
-            </a:r>
+              <a:rPr lang="fr-FR" dirty="0"/>
+              <a:t>&lt;</a:t>
+            </a:r>
+            <a:r>
+              <a:rPr lang="fr-FR" dirty="0" err="1"/>
+              <a:t>source_banner</a:t>
+            </a:r>
+            <a:r>
+              <a:rPr lang="fr-FR" dirty="0"/>
+              <a:t>&gt;</a:t>
+            </a:r>
+          </a:p>
+        </p:txBody>
+      </p:sp>
+      <p:sp>
+        <p:nvSpPr>
+          <p:cNvPr id="3" name="Espace réservé du contenu 4">
+            <a:extLst>
+              <a:ext uri="{FF2B5EF4-FFF2-40B4-BE49-F238E27FC236}">
+                <a16:creationId xmlns:a16="http://schemas.microsoft.com/office/drawing/2014/main" id="{17836FF2-443C-DD1C-FB6F-D9F998B642E4}"/>
+              </a:ext>
+            </a:extLst>
+          </p:cNvPr>
+          <p:cNvSpPr txBox="1">
+            <a:spLocks/>
+          </p:cNvSpPr>
+          <p:nvPr>
+            <p:custDataLst>
+              <p:tags r:id="rId1"/>
+            </p:custDataLst>
+          </p:nvPr>
+        </p:nvSpPr>
+        <p:spPr>
+          <a:xfrm>
+            <a:off x="300181" y="1452518"/>
+            <a:ext cx="6557819" cy="5232169"/>
+          </a:xfrm>
+          <a:prstGeom prst="rect">
+            <a:avLst/>
+          </a:prstGeom>
+        </p:spPr>
+        <p:txBody>
+          <a:bodyPr lIns="91440" tIns="45720" rIns="91440" bIns="45720" numCol="2" anchor="t">
+            <a:noAutofit/>
+          </a:bodyPr>
+          <a:lstStyle>
+            <a:lvl1pPr marL="128585" indent="-128585" algn="l" defTabSz="514337" rtl="0" eaLnBrk="1" latinLnBrk="0" hangingPunct="1">
+              <a:lnSpc>
+                <a:spcPct val="90000"/>
+              </a:lnSpc>
+              <a:spcBef>
+                <a:spcPts val="563"/>
+              </a:spcBef>
+              <a:buClr>
+                <a:schemeClr val="accent2"/>
+              </a:buClr>
+              <a:buFont typeface="Arial" panose="020B0604020202020204" pitchFamily="34" charset="0"/>
+              <a:buChar char="•"/>
+              <a:defRPr sz="1575" kern="1200">
+                <a:solidFill>
+                  <a:schemeClr val="tx1"/>
+                </a:solidFill>
+                <a:latin typeface="+mn-lt"/>
+                <a:ea typeface="+mn-ea"/>
+                <a:cs typeface="+mn-cs"/>
+              </a:defRPr>
+            </a:lvl1pPr>
+            <a:lvl2pPr marL="385754" indent="-128585" algn="l" defTabSz="514337" rtl="0" eaLnBrk="1" latinLnBrk="0" hangingPunct="1">
+              <a:lnSpc>
+                <a:spcPct val="90000"/>
+              </a:lnSpc>
+              <a:spcBef>
+                <a:spcPts val="281"/>
+              </a:spcBef>
+              <a:buClr>
+                <a:schemeClr val="accent5"/>
+              </a:buClr>
+              <a:buFont typeface="Arial" panose="020B0604020202020204" pitchFamily="34" charset="0"/>
+              <a:buChar char="•"/>
+              <a:defRPr sz="1350" kern="1200">
+                <a:solidFill>
+                  <a:schemeClr val="tx1"/>
+                </a:solidFill>
+                <a:latin typeface="+mn-lt"/>
+                <a:ea typeface="+mn-ea"/>
+                <a:cs typeface="+mn-cs"/>
+              </a:defRPr>
+            </a:lvl2pPr>
+            <a:lvl3pPr marL="642922" indent="-128585" algn="l" defTabSz="514337" rtl="0" eaLnBrk="1" latinLnBrk="0" hangingPunct="1">
+              <a:lnSpc>
+                <a:spcPct val="90000"/>
+              </a:lnSpc>
+              <a:spcBef>
+                <a:spcPts val="281"/>
+              </a:spcBef>
+              <a:buClr>
+                <a:schemeClr val="accent6"/>
+              </a:buClr>
+              <a:buFont typeface="Arial" panose="020B0604020202020204" pitchFamily="34" charset="0"/>
+              <a:buChar char="•"/>
+              <a:defRPr sz="1125" kern="1200">
+                <a:solidFill>
+                  <a:schemeClr val="tx1"/>
+                </a:solidFill>
+                <a:latin typeface="+mn-lt"/>
+                <a:ea typeface="+mn-ea"/>
+                <a:cs typeface="+mn-cs"/>
+              </a:defRPr>
+            </a:lvl3pPr>
+            <a:lvl4pPr marL="900091" indent="-128585" algn="l" defTabSz="514337" rtl="0" eaLnBrk="1" latinLnBrk="0" hangingPunct="1">
+              <a:lnSpc>
+                <a:spcPct val="90000"/>
+              </a:lnSpc>
+              <a:spcBef>
+                <a:spcPts val="281"/>
+              </a:spcBef>
+              <a:buClr>
+                <a:schemeClr val="accent6">
+                  <a:lumMod val="60000"/>
+                  <a:lumOff val="40000"/>
+                </a:schemeClr>
+              </a:buClr>
+              <a:buFont typeface="Arial" panose="020B0604020202020204" pitchFamily="34" charset="0"/>
+              <a:buChar char="•"/>
+              <a:defRPr sz="1013" kern="1200">
+                <a:solidFill>
+                  <a:schemeClr val="tx1"/>
+                </a:solidFill>
+                <a:latin typeface="+mn-lt"/>
+                <a:ea typeface="+mn-ea"/>
+                <a:cs typeface="+mn-cs"/>
+              </a:defRPr>
+            </a:lvl4pPr>
+            <a:lvl5pPr marL="1157259" indent="-128585" algn="l" defTabSz="514337" rtl="0" eaLnBrk="1" latinLnBrk="0" hangingPunct="1">
+              <a:lnSpc>
+                <a:spcPct val="90000"/>
+              </a:lnSpc>
+              <a:spcBef>
+                <a:spcPts val="281"/>
+              </a:spcBef>
+              <a:buClr>
+                <a:schemeClr val="accent6">
+                  <a:lumMod val="40000"/>
+                  <a:lumOff val="60000"/>
+                </a:schemeClr>
+              </a:buClr>
+              <a:buFont typeface="Arial" panose="020B0604020202020204" pitchFamily="34" charset="0"/>
+              <a:buChar char="•"/>
+              <a:defRPr sz="1013" kern="1200">
+                <a:solidFill>
+                  <a:schemeClr val="tx1"/>
+                </a:solidFill>
+                <a:latin typeface="+mn-lt"/>
+                <a:ea typeface="+mn-ea"/>
+                <a:cs typeface="+mn-cs"/>
+              </a:defRPr>
+            </a:lvl5pPr>
+            <a:lvl6pPr marL="1414428" indent="-128585" algn="l" defTabSz="514337" rtl="0" eaLnBrk="1" latinLnBrk="0" hangingPunct="1">
+              <a:lnSpc>
+                <a:spcPct val="90000"/>
+              </a:lnSpc>
+              <a:spcBef>
+                <a:spcPts val="281"/>
+              </a:spcBef>
+              <a:buFont typeface="Arial" panose="020B0604020202020204" pitchFamily="34" charset="0"/>
+              <a:buChar char="•"/>
+              <a:defRPr sz="1013" kern="1200">
+                <a:solidFill>
+                  <a:schemeClr val="tx1"/>
+                </a:solidFill>
+                <a:latin typeface="+mn-lt"/>
+                <a:ea typeface="+mn-ea"/>
+                <a:cs typeface="+mn-cs"/>
+              </a:defRPr>
+            </a:lvl6pPr>
+            <a:lvl7pPr marL="1671596" indent="-128585" algn="l" defTabSz="514337" rtl="0" eaLnBrk="1" latinLnBrk="0" hangingPunct="1">
+              <a:lnSpc>
+                <a:spcPct val="90000"/>
+              </a:lnSpc>
+              <a:spcBef>
+                <a:spcPts val="281"/>
+              </a:spcBef>
+              <a:buFont typeface="Arial" panose="020B0604020202020204" pitchFamily="34" charset="0"/>
+              <a:buChar char="•"/>
+              <a:defRPr sz="1013" kern="1200">
+                <a:solidFill>
+                  <a:schemeClr val="tx1"/>
+                </a:solidFill>
+                <a:latin typeface="+mn-lt"/>
+                <a:ea typeface="+mn-ea"/>
+                <a:cs typeface="+mn-cs"/>
+              </a:defRPr>
+            </a:lvl7pPr>
+            <a:lvl8pPr marL="1928765" indent="-128585" algn="l" defTabSz="514337" rtl="0" eaLnBrk="1" latinLnBrk="0" hangingPunct="1">
+              <a:lnSpc>
+                <a:spcPct val="90000"/>
+              </a:lnSpc>
+              <a:spcBef>
+                <a:spcPts val="281"/>
+              </a:spcBef>
+              <a:buFont typeface="Arial" panose="020B0604020202020204" pitchFamily="34" charset="0"/>
+              <a:buChar char="•"/>
+              <a:defRPr sz="1013" kern="1200">
+                <a:solidFill>
+                  <a:schemeClr val="tx1"/>
+                </a:solidFill>
+                <a:latin typeface="+mn-lt"/>
+                <a:ea typeface="+mn-ea"/>
+                <a:cs typeface="+mn-cs"/>
+              </a:defRPr>
+            </a:lvl8pPr>
+            <a:lvl9pPr marL="2185934" indent="-128585" algn="l" defTabSz="514337" rtl="0" eaLnBrk="1" latinLnBrk="0" hangingPunct="1">
+              <a:lnSpc>
+                <a:spcPct val="90000"/>
+              </a:lnSpc>
+              <a:spcBef>
+                <a:spcPts val="281"/>
+              </a:spcBef>
+              <a:buFont typeface="Arial" panose="020B0604020202020204" pitchFamily="34" charset="0"/>
+              <a:buChar char="•"/>
+              <a:defRPr sz="1013" kern="1200">
+                <a:solidFill>
+                  <a:schemeClr val="tx1"/>
+                </a:solidFill>
+                <a:latin typeface="+mn-lt"/>
+                <a:ea typeface="+mn-ea"/>
+                <a:cs typeface="+mn-cs"/>
+              </a:defRPr>
+            </a:lvl9pPr>
+          </a:lstStyle>
+          <a:p>
+            <a:pPr marL="228600" indent="-228600">
+              <a:lnSpc>
+                <a:spcPct val="100000"/>
+              </a:lnSpc>
+              <a:buFont typeface="Arial" panose="020B0604020202020204" pitchFamily="34" charset="0"/>
+              <a:buAutoNum type="arabicPeriod"/>
+            </a:pPr>
+            <a:r>
+              <a:rPr lang="en-US" sz="800" b="0" i="0" dirty="0">
+                <a:solidFill>
+                  <a:srgbClr val="000000"/>
+                </a:solidFill>
+                <a:effectLst/>
+                <a:latin typeface="+mj-lt"/>
+              </a:rPr>
+              <a:t>&lt;source&gt;</a:t>
+            </a:r>
+          </a:p>
+          <a:p>
+            <a:pPr marL="228600" indent="-228600">
+              <a:lnSpc>
+                <a:spcPct val="100000"/>
+              </a:lnSpc>
+              <a:buAutoNum type="arabicPeriod"/>
+            </a:pPr>
+            <a:r>
+              <a:rPr lang="en-US" sz="800" b="0" i="0" dirty="0">
+                <a:solidFill>
+                  <a:srgbClr val="000000"/>
+                </a:solidFill>
+                <a:effectLst/>
+                <a:latin typeface="+mj-lt"/>
+              </a:rPr>
+              <a:t>&lt;source&gt;</a:t>
+            </a:r>
+            <a:endParaRPr lang="en-US" sz="800" dirty="0">
+              <a:solidFill>
+                <a:srgbClr val="000000"/>
+              </a:solidFill>
+              <a:latin typeface="+mj-lt"/>
+            </a:endParaRPr>
+          </a:p>
+          <a:p>
+            <a:pPr marL="228600" indent="-228600">
+              <a:lnSpc>
+                <a:spcPct val="100000"/>
+              </a:lnSpc>
+              <a:buFont typeface="Arial" panose="020B0604020202020204" pitchFamily="34" charset="0"/>
+              <a:buAutoNum type="arabicPeriod"/>
+            </a:pPr>
+            <a:r>
+              <a:rPr lang="en-US" sz="800" b="0" i="0" dirty="0">
+                <a:solidFill>
+                  <a:srgbClr val="000000"/>
+                </a:solidFill>
+                <a:effectLst/>
+                <a:latin typeface="+mj-lt"/>
+              </a:rPr>
+              <a:t>&lt;source&gt;</a:t>
+            </a:r>
+          </a:p>
+          <a:p>
+            <a:pPr marL="228600" indent="-228600">
+              <a:lnSpc>
+                <a:spcPct val="100000"/>
+              </a:lnSpc>
+              <a:buAutoNum type="arabicPeriod"/>
+            </a:pPr>
+            <a:r>
+              <a:rPr lang="en-US" sz="800" b="0" i="0" dirty="0">
+                <a:solidFill>
+                  <a:srgbClr val="000000"/>
+                </a:solidFill>
+                <a:effectLst/>
+                <a:latin typeface="+mj-lt"/>
+              </a:rPr>
+              <a:t>&lt;source&gt;</a:t>
+            </a:r>
+            <a:endParaRPr lang="en-US" sz="800" dirty="0">
+              <a:solidFill>
+                <a:srgbClr val="000000"/>
+              </a:solidFill>
+              <a:latin typeface="+mj-lt"/>
+            </a:endParaRPr>
+          </a:p>
+          <a:p>
+            <a:pPr marL="228600" indent="-228600">
+              <a:lnSpc>
+                <a:spcPct val="100000"/>
+              </a:lnSpc>
+              <a:buFont typeface="Arial" panose="020B0604020202020204" pitchFamily="34" charset="0"/>
+              <a:buAutoNum type="arabicPeriod"/>
+            </a:pPr>
+            <a:r>
+              <a:rPr lang="en-US" sz="800" b="0" i="0" dirty="0">
+                <a:solidFill>
+                  <a:srgbClr val="000000"/>
+                </a:solidFill>
+                <a:effectLst/>
+                <a:latin typeface="+mj-lt"/>
+              </a:rPr>
+              <a:t>&lt;source&gt;</a:t>
+            </a:r>
+            <a:endParaRPr lang="fr-FR" sz="800" b="0" i="0" dirty="0">
+              <a:solidFill>
+                <a:srgbClr val="000000"/>
+              </a:solidFill>
+              <a:effectLst/>
+              <a:latin typeface="+mj-lt"/>
+            </a:endParaRPr>
+          </a:p>
+          <a:p>
+            <a:pPr marL="228600" indent="-228600">
+              <a:lnSpc>
+                <a:spcPct val="100000"/>
+              </a:lnSpc>
+              <a:buAutoNum type="arabicPeriod"/>
+            </a:pPr>
+            <a:r>
+              <a:rPr lang="en-US" sz="800" b="0" i="0" dirty="0">
+                <a:solidFill>
+                  <a:srgbClr val="000000"/>
+                </a:solidFill>
+                <a:effectLst/>
+                <a:latin typeface="+mj-lt"/>
+              </a:rPr>
+              <a:t>&lt;source&gt;</a:t>
+            </a:r>
+            <a:endParaRPr lang="en-US" sz="800" dirty="0">
+              <a:solidFill>
+                <a:srgbClr val="000000"/>
+              </a:solidFill>
+              <a:latin typeface="+mj-lt"/>
+            </a:endParaRPr>
+          </a:p>
+          <a:p>
+            <a:pPr marL="228600" indent="-228600">
+              <a:lnSpc>
+                <a:spcPct val="100000"/>
+              </a:lnSpc>
+              <a:buAutoNum type="arabicPeriod"/>
+            </a:pPr>
+            <a:r>
+              <a:rPr lang="en-US" sz="800" b="0" i="0" dirty="0">
+                <a:solidFill>
+                  <a:srgbClr val="000000"/>
+                </a:solidFill>
+                <a:effectLst/>
+                <a:latin typeface="+mj-lt"/>
+              </a:rPr>
+              <a:t>&lt;source&gt;</a:t>
+            </a:r>
+            <a:endParaRPr lang="en-US" sz="800" dirty="0">
+              <a:solidFill>
+                <a:srgbClr val="000000"/>
+              </a:solidFill>
+              <a:latin typeface="+mj-lt"/>
+            </a:endParaRPr>
+          </a:p>
+          <a:p>
+            <a:pPr marL="228600" indent="-228600">
+              <a:lnSpc>
+                <a:spcPct val="100000"/>
+              </a:lnSpc>
+              <a:buAutoNum type="arabicPeriod"/>
+            </a:pPr>
+            <a:r>
+              <a:rPr lang="en-US" sz="800" b="0" i="0" dirty="0">
+                <a:solidFill>
+                  <a:srgbClr val="000000"/>
+                </a:solidFill>
+                <a:effectLst/>
+                <a:latin typeface="+mj-lt"/>
+              </a:rPr>
+              <a:t>&lt;source&gt;</a:t>
+            </a:r>
+            <a:endParaRPr lang="en-US" sz="800" dirty="0">
+              <a:solidFill>
+                <a:srgbClr val="000000"/>
+              </a:solidFill>
+              <a:latin typeface="+mj-lt"/>
+            </a:endParaRPr>
+          </a:p>
+          <a:p>
+            <a:pPr marL="228600" indent="-228600">
+              <a:lnSpc>
+                <a:spcPct val="100000"/>
+              </a:lnSpc>
+              <a:buAutoNum type="arabicPeriod"/>
+            </a:pPr>
+            <a:r>
+              <a:rPr lang="en-US" sz="800" b="0" i="0" dirty="0">
+                <a:solidFill>
+                  <a:srgbClr val="000000"/>
+                </a:solidFill>
+                <a:effectLst/>
+                <a:latin typeface="+mj-lt"/>
+              </a:rPr>
+              <a:t>&lt;source&gt;</a:t>
+            </a:r>
+            <a:endParaRPr lang="en-US" sz="800" dirty="0">
+              <a:solidFill>
+                <a:srgbClr val="000000"/>
+              </a:solidFill>
+              <a:latin typeface="+mj-lt"/>
+            </a:endParaRPr>
+          </a:p>
+          <a:p>
+            <a:pPr marL="228600" indent="-228600">
+              <a:lnSpc>
+                <a:spcPct val="100000"/>
+              </a:lnSpc>
+              <a:buAutoNum type="arabicPeriod"/>
+            </a:pPr>
+            <a:r>
+              <a:rPr lang="en-US" sz="800" b="0" i="0" dirty="0">
+                <a:solidFill>
+                  <a:srgbClr val="000000"/>
+                </a:solidFill>
+                <a:effectLst/>
+                <a:latin typeface="+mj-lt"/>
+              </a:rPr>
+              <a:t>&lt;source&gt;</a:t>
+            </a:r>
+            <a:endParaRPr lang="en-US" sz="800" dirty="0">
+              <a:solidFill>
+                <a:srgbClr val="000000"/>
+              </a:solidFill>
+              <a:latin typeface="+mj-lt"/>
+            </a:endParaRPr>
+          </a:p>
+          <a:p>
+            <a:pPr marL="228600" indent="-228600">
+              <a:lnSpc>
+                <a:spcPct val="100000"/>
+              </a:lnSpc>
+              <a:buAutoNum type="arabicPeriod"/>
+            </a:pPr>
+            <a:r>
+              <a:rPr lang="en-US" sz="800" b="0" i="0" dirty="0">
+                <a:solidFill>
+                  <a:srgbClr val="000000"/>
+                </a:solidFill>
+                <a:effectLst/>
+                <a:latin typeface="+mj-lt"/>
+              </a:rPr>
+              <a:t>&lt;source&gt;</a:t>
+            </a:r>
+            <a:endParaRPr lang="en-US" sz="800" dirty="0">
+              <a:solidFill>
+                <a:srgbClr val="000000"/>
+              </a:solidFill>
+              <a:latin typeface="+mj-lt"/>
+            </a:endParaRPr>
+          </a:p>
+          <a:p>
+            <a:pPr marL="228600" indent="-228600">
+              <a:lnSpc>
+                <a:spcPct val="100000"/>
+              </a:lnSpc>
+              <a:buAutoNum type="arabicPeriod"/>
+            </a:pPr>
+            <a:r>
+              <a:rPr lang="en-US" sz="800" b="0" i="0" dirty="0">
+                <a:solidFill>
+                  <a:srgbClr val="000000"/>
+                </a:solidFill>
+                <a:effectLst/>
+                <a:latin typeface="+mj-lt"/>
+              </a:rPr>
+              <a:t>&lt;source&gt;</a:t>
+            </a:r>
+            <a:endParaRPr lang="en-US" sz="800" dirty="0">
+              <a:solidFill>
+                <a:srgbClr val="000000"/>
+              </a:solidFill>
+              <a:latin typeface="+mj-lt"/>
+            </a:endParaRPr>
+          </a:p>
+          <a:p>
+            <a:pPr marL="228600" indent="-228600">
+              <a:lnSpc>
+                <a:spcPct val="100000"/>
+              </a:lnSpc>
+              <a:buAutoNum type="arabicPeriod"/>
+            </a:pPr>
+            <a:r>
+              <a:rPr lang="en-US" sz="800" b="0" i="0" dirty="0">
+                <a:solidFill>
+                  <a:srgbClr val="000000"/>
+                </a:solidFill>
+                <a:effectLst/>
+                <a:latin typeface="+mj-lt"/>
+              </a:rPr>
+              <a:t>&lt;source&gt;</a:t>
+            </a:r>
+            <a:endParaRPr lang="en-US" sz="800" dirty="0">
+              <a:solidFill>
+                <a:srgbClr val="000000"/>
+              </a:solidFill>
+              <a:latin typeface="+mj-lt"/>
+            </a:endParaRPr>
+          </a:p>
+          <a:p>
+            <a:pPr marL="228600" indent="-228600">
+              <a:lnSpc>
+                <a:spcPct val="100000"/>
+              </a:lnSpc>
+              <a:buAutoNum type="arabicPeriod"/>
+            </a:pPr>
+            <a:r>
+              <a:rPr lang="en-US" sz="800" b="0" i="0" dirty="0">
+                <a:solidFill>
+                  <a:srgbClr val="000000"/>
+                </a:solidFill>
+                <a:effectLst/>
+                <a:latin typeface="+mj-lt"/>
+              </a:rPr>
+              <a:t>&lt;source&gt;</a:t>
+            </a:r>
+            <a:endParaRPr lang="en-US" sz="800" dirty="0">
+              <a:solidFill>
+                <a:srgbClr val="000000"/>
+              </a:solidFill>
+              <a:latin typeface="+mj-lt"/>
+            </a:endParaRPr>
+          </a:p>
+          <a:p>
+            <a:pPr marL="228600" indent="-228600">
+              <a:lnSpc>
+                <a:spcPct val="100000"/>
+              </a:lnSpc>
+              <a:buAutoNum type="arabicPeriod"/>
+            </a:pPr>
+            <a:r>
+              <a:rPr lang="en-US" sz="800" b="0" i="0" dirty="0">
+                <a:solidFill>
+                  <a:srgbClr val="000000"/>
+                </a:solidFill>
+                <a:effectLst/>
+                <a:latin typeface="+mj-lt"/>
+              </a:rPr>
+              <a:t>&lt;source&gt;</a:t>
+            </a:r>
+            <a:endParaRPr lang="en-US" sz="800" dirty="0">
+              <a:solidFill>
+                <a:srgbClr val="000000"/>
+              </a:solidFill>
+              <a:latin typeface="+mj-lt"/>
+            </a:endParaRPr>
+          </a:p>
+          <a:p>
+            <a:pPr marL="228600" indent="-228600">
+              <a:lnSpc>
+                <a:spcPct val="100000"/>
+              </a:lnSpc>
+              <a:buAutoNum type="arabicPeriod"/>
+            </a:pPr>
+            <a:r>
+              <a:rPr lang="en-US" sz="800" b="0" i="0" dirty="0">
+                <a:solidFill>
+                  <a:srgbClr val="000000"/>
+                </a:solidFill>
+                <a:effectLst/>
+                <a:latin typeface="+mj-lt"/>
+              </a:rPr>
+              <a:t>&lt;source&gt;</a:t>
+            </a:r>
+            <a:endParaRPr lang="en-US" sz="800" dirty="0">
+              <a:solidFill>
+                <a:srgbClr val="000000"/>
+              </a:solidFill>
+              <a:latin typeface="+mj-lt"/>
+            </a:endParaRPr>
+          </a:p>
+          <a:p>
+            <a:pPr marL="228600" indent="-228600">
+              <a:lnSpc>
+                <a:spcPct val="100000"/>
+              </a:lnSpc>
+              <a:buAutoNum type="arabicPeriod"/>
+            </a:pPr>
+            <a:r>
+              <a:rPr lang="en-US" sz="800" b="0" i="0" dirty="0">
+                <a:solidFill>
+                  <a:srgbClr val="000000"/>
+                </a:solidFill>
+                <a:effectLst/>
+                <a:latin typeface="+mj-lt"/>
+              </a:rPr>
+              <a:t>&lt;source&gt;</a:t>
+            </a:r>
+            <a:endParaRPr lang="en-US" sz="800" dirty="0">
+              <a:solidFill>
+                <a:srgbClr val="000000"/>
+              </a:solidFill>
+              <a:latin typeface="+mj-lt"/>
+            </a:endParaRPr>
+          </a:p>
+          <a:p>
+            <a:pPr marL="228600" indent="-228600">
+              <a:lnSpc>
+                <a:spcPct val="100000"/>
+              </a:lnSpc>
+              <a:buAutoNum type="arabicPeriod"/>
+            </a:pPr>
+            <a:r>
+              <a:rPr lang="en-US" sz="800" b="0" i="0" dirty="0">
+                <a:solidFill>
+                  <a:srgbClr val="000000"/>
+                </a:solidFill>
+                <a:effectLst/>
+                <a:latin typeface="+mj-lt"/>
+              </a:rPr>
+              <a:t>&lt;source&gt;</a:t>
+            </a:r>
+            <a:endParaRPr lang="en-US" sz="800" dirty="0">
+              <a:solidFill>
+                <a:srgbClr val="000000"/>
+              </a:solidFill>
+              <a:latin typeface="+mj-lt"/>
+            </a:endParaRPr>
+          </a:p>
+          <a:p>
+            <a:pPr marL="228600" indent="-228600">
+              <a:lnSpc>
+                <a:spcPct val="100000"/>
+              </a:lnSpc>
+              <a:buAutoNum type="arabicPeriod"/>
+            </a:pPr>
+            <a:r>
+              <a:rPr lang="en-US" sz="800" b="0" i="0" dirty="0">
+                <a:solidFill>
+                  <a:srgbClr val="000000"/>
+                </a:solidFill>
+                <a:effectLst/>
+                <a:latin typeface="+mj-lt"/>
+              </a:rPr>
+              <a:t>&lt;source&gt;</a:t>
+            </a:r>
+            <a:endParaRPr lang="en-US" sz="800" dirty="0">
+              <a:solidFill>
+                <a:srgbClr val="000000"/>
+              </a:solidFill>
+              <a:latin typeface="+mj-lt"/>
+            </a:endParaRPr>
+          </a:p>
+          <a:p>
+            <a:pPr marL="228600" indent="-228600">
+              <a:lnSpc>
+                <a:spcPct val="100000"/>
+              </a:lnSpc>
+              <a:buAutoNum type="arabicPeriod"/>
+            </a:pPr>
+            <a:r>
+              <a:rPr lang="en-US" sz="800" b="0" i="0" dirty="0">
+                <a:solidFill>
+                  <a:srgbClr val="000000"/>
+                </a:solidFill>
+                <a:effectLst/>
+                <a:latin typeface="+mj-lt"/>
+              </a:rPr>
+              <a:t>&lt;source&gt;</a:t>
+            </a:r>
+            <a:endParaRPr lang="en-US" sz="800" dirty="0">
+              <a:solidFill>
+                <a:srgbClr val="000000"/>
+              </a:solidFill>
+              <a:latin typeface="+mj-lt"/>
+            </a:endParaRPr>
+          </a:p>
+          <a:p>
+            <a:pPr marL="228600" indent="-228600">
+              <a:lnSpc>
+                <a:spcPct val="100000"/>
+              </a:lnSpc>
+              <a:buAutoNum type="arabicPeriod"/>
+            </a:pPr>
+            <a:r>
+              <a:rPr lang="en-US" sz="800" b="0" i="0" dirty="0">
+                <a:solidFill>
+                  <a:srgbClr val="000000"/>
+                </a:solidFill>
+                <a:effectLst/>
+                <a:latin typeface="+mj-lt"/>
+              </a:rPr>
+              <a:t>&lt;source&gt;</a:t>
+            </a:r>
+            <a:endParaRPr lang="en-US" sz="800" dirty="0">
+              <a:solidFill>
+                <a:srgbClr val="000000"/>
+              </a:solidFill>
+              <a:latin typeface="+mj-lt"/>
+            </a:endParaRPr>
+          </a:p>
+          <a:p>
+            <a:pPr marL="228600" indent="-228600">
+              <a:lnSpc>
+                <a:spcPct val="100000"/>
+              </a:lnSpc>
+              <a:buAutoNum type="arabicPeriod"/>
+            </a:pPr>
+            <a:r>
+              <a:rPr lang="en-US" sz="800" b="0" i="0" dirty="0">
+                <a:solidFill>
+                  <a:srgbClr val="000000"/>
+                </a:solidFill>
+                <a:effectLst/>
+                <a:latin typeface="+mj-lt"/>
+              </a:rPr>
+              <a:t>&lt;source&gt;</a:t>
+            </a:r>
+            <a:endParaRPr lang="en-US" sz="800" dirty="0">
+              <a:solidFill>
+                <a:srgbClr val="000000"/>
+              </a:solidFill>
+              <a:latin typeface="+mj-lt"/>
+            </a:endParaRPr>
+          </a:p>
+          <a:p>
+            <a:pPr marL="228600" indent="-228600">
+              <a:lnSpc>
+                <a:spcPct val="100000"/>
+              </a:lnSpc>
+              <a:buAutoNum type="arabicPeriod"/>
+            </a:pPr>
+            <a:r>
+              <a:rPr lang="en-US" sz="800" b="0" i="0" dirty="0">
+                <a:solidFill>
+                  <a:srgbClr val="000000"/>
+                </a:solidFill>
+                <a:effectLst/>
+                <a:latin typeface="+mj-lt"/>
+              </a:rPr>
+              <a:t>&lt;source&gt;</a:t>
+            </a:r>
+            <a:endParaRPr lang="en-US" sz="800" dirty="0">
+              <a:solidFill>
+                <a:srgbClr val="000000"/>
+              </a:solidFill>
+              <a:latin typeface="+mj-lt"/>
+            </a:endParaRPr>
+          </a:p>
+          <a:p>
+            <a:pPr marL="228600" indent="-228600">
+              <a:lnSpc>
+                <a:spcPct val="100000"/>
+              </a:lnSpc>
+              <a:buAutoNum type="arabicPeriod"/>
+            </a:pPr>
+            <a:r>
+              <a:rPr lang="en-US" sz="800" b="0" i="0" dirty="0">
+                <a:solidFill>
+                  <a:srgbClr val="000000"/>
+                </a:solidFill>
+                <a:effectLst/>
+                <a:latin typeface="+mj-lt"/>
+              </a:rPr>
+              <a:t> &lt;source&gt;</a:t>
+            </a:r>
+          </a:p>
+          <a:p>
+            <a:pPr marL="228600" indent="-228600">
+              <a:lnSpc>
+                <a:spcPct val="100000"/>
+              </a:lnSpc>
+              <a:buFont typeface="Arial" panose="020B0604020202020204" pitchFamily="34" charset="0"/>
+              <a:buAutoNum type="arabicPeriod"/>
+            </a:pPr>
+            <a:r>
+              <a:rPr lang="en-US" sz="800" b="0" i="0" dirty="0">
+                <a:solidFill>
+                  <a:srgbClr val="000000"/>
+                </a:solidFill>
+                <a:effectLst/>
+                <a:latin typeface="+mj-lt"/>
+              </a:rPr>
+              <a:t>&lt;source&gt;</a:t>
+            </a:r>
+            <a:endParaRPr lang="en-US" sz="800" dirty="0">
+              <a:solidFill>
+                <a:srgbClr val="000000"/>
+              </a:solidFill>
+              <a:latin typeface="+mj-lt"/>
+            </a:endParaRPr>
+          </a:p>
+          <a:p>
+            <a:pPr marL="228600" indent="-228600">
+              <a:lnSpc>
+                <a:spcPct val="100000"/>
+              </a:lnSpc>
+              <a:buFont typeface="Arial" panose="020B0604020202020204" pitchFamily="34" charset="0"/>
+              <a:buAutoNum type="arabicPeriod"/>
+            </a:pPr>
+            <a:r>
+              <a:rPr lang="en-US" sz="800" b="0" i="0" dirty="0">
+                <a:solidFill>
+                  <a:srgbClr val="000000"/>
+                </a:solidFill>
+                <a:effectLst/>
+                <a:latin typeface="+mj-lt"/>
+              </a:rPr>
+              <a:t>&lt;source&gt;</a:t>
+            </a:r>
+            <a:endParaRPr lang="en-US" sz="800" dirty="0">
+              <a:solidFill>
+                <a:srgbClr val="000000"/>
+              </a:solidFill>
+              <a:latin typeface="+mj-lt"/>
+            </a:endParaRPr>
+          </a:p>
+          <a:p>
+            <a:pPr marL="228600" indent="-228600">
+              <a:lnSpc>
+                <a:spcPct val="100000"/>
+              </a:lnSpc>
+              <a:buFont typeface="Arial" panose="020B0604020202020204" pitchFamily="34" charset="0"/>
+              <a:buAutoNum type="arabicPeriod"/>
+            </a:pPr>
+            <a:r>
+              <a:rPr lang="en-US" sz="800" b="0" i="0" dirty="0">
+                <a:solidFill>
+                  <a:srgbClr val="000000"/>
+                </a:solidFill>
+                <a:effectLst/>
+                <a:latin typeface="+mj-lt"/>
+              </a:rPr>
+              <a:t>&lt;source&gt;</a:t>
+            </a:r>
+            <a:endParaRPr lang="en-US" sz="800" dirty="0">
+              <a:solidFill>
+                <a:srgbClr val="000000"/>
+              </a:solidFill>
+              <a:latin typeface="+mj-lt"/>
+            </a:endParaRPr>
+          </a:p>
+          <a:p>
+            <a:pPr marL="228600" indent="-228600">
+              <a:lnSpc>
+                <a:spcPct val="100000"/>
+              </a:lnSpc>
+              <a:buFont typeface="Arial" panose="020B0604020202020204" pitchFamily="34" charset="0"/>
+              <a:buAutoNum type="arabicPeriod"/>
+            </a:pPr>
+            <a:r>
+              <a:rPr lang="en-US" sz="800" b="0" i="0" dirty="0">
+                <a:solidFill>
+                  <a:srgbClr val="000000"/>
+                </a:solidFill>
+                <a:effectLst/>
+                <a:latin typeface="+mj-lt"/>
+              </a:rPr>
+              <a:t>&lt;source&gt;</a:t>
+            </a:r>
+            <a:endParaRPr lang="en-US" sz="800" dirty="0">
+              <a:solidFill>
+                <a:srgbClr val="000000"/>
+              </a:solidFill>
+              <a:latin typeface="+mj-lt"/>
+            </a:endParaRPr>
+          </a:p>
+          <a:p>
+            <a:pPr marL="228600" indent="-228600">
+              <a:lnSpc>
+                <a:spcPct val="100000"/>
+              </a:lnSpc>
+              <a:buFont typeface="Arial" panose="020B0604020202020204" pitchFamily="34" charset="0"/>
+              <a:buAutoNum type="arabicPeriod"/>
+            </a:pPr>
+            <a:r>
+              <a:rPr lang="en-US" sz="800" b="0" i="0" dirty="0">
+                <a:solidFill>
+                  <a:srgbClr val="000000"/>
+                </a:solidFill>
+                <a:effectLst/>
+                <a:latin typeface="+mj-lt"/>
+              </a:rPr>
+              <a:t>&lt;source&gt;</a:t>
+            </a:r>
+            <a:endParaRPr lang="en-US" sz="800" dirty="0">
+              <a:solidFill>
+                <a:srgbClr val="000000"/>
+              </a:solidFill>
+              <a:latin typeface="+mj-lt"/>
+            </a:endParaRPr>
+          </a:p>
+          <a:p>
+            <a:pPr marL="228600" indent="-228600">
+              <a:lnSpc>
+                <a:spcPct val="100000"/>
+              </a:lnSpc>
+              <a:buFont typeface="Arial" panose="020B0604020202020204" pitchFamily="34" charset="0"/>
+              <a:buAutoNum type="arabicPeriod"/>
+            </a:pPr>
+            <a:r>
+              <a:rPr lang="en-US" sz="800" b="0" i="0" dirty="0">
+                <a:solidFill>
+                  <a:srgbClr val="000000"/>
+                </a:solidFill>
+                <a:effectLst/>
+                <a:latin typeface="+mj-lt"/>
+              </a:rPr>
+              <a:t>&lt;source&gt;</a:t>
+            </a:r>
+            <a:endParaRPr lang="en-US" sz="800" dirty="0">
+              <a:solidFill>
+                <a:srgbClr val="000000"/>
+              </a:solidFill>
+              <a:latin typeface="+mj-lt"/>
+            </a:endParaRPr>
+          </a:p>
+          <a:p>
+            <a:pPr marL="228600" indent="-228600">
+              <a:lnSpc>
+                <a:spcPct val="100000"/>
+              </a:lnSpc>
+              <a:buFont typeface="Arial" panose="020B0604020202020204" pitchFamily="34" charset="0"/>
+              <a:buAutoNum type="arabicPeriod"/>
+            </a:pPr>
+            <a:r>
+              <a:rPr lang="en-US" sz="800" b="0" i="0" dirty="0">
+                <a:solidFill>
+                  <a:srgbClr val="000000"/>
+                </a:solidFill>
+                <a:effectLst/>
+                <a:latin typeface="+mj-lt"/>
+              </a:rPr>
+              <a:t>&lt;source&gt;</a:t>
+            </a:r>
+            <a:endParaRPr lang="en-US" sz="800" dirty="0">
+              <a:solidFill>
+                <a:srgbClr val="000000"/>
+              </a:solidFill>
+              <a:latin typeface="+mj-lt"/>
+            </a:endParaRPr>
+          </a:p>
+          <a:p>
+            <a:pPr marL="228600" indent="-228600">
+              <a:lnSpc>
+                <a:spcPct val="100000"/>
+              </a:lnSpc>
+              <a:buFont typeface="Arial" panose="020B0604020202020204" pitchFamily="34" charset="0"/>
+              <a:buAutoNum type="arabicPeriod"/>
+            </a:pPr>
+            <a:r>
+              <a:rPr lang="en-US" sz="800" b="0" i="0" dirty="0">
+                <a:solidFill>
+                  <a:srgbClr val="000000"/>
+                </a:solidFill>
+                <a:effectLst/>
+                <a:latin typeface="+mj-lt"/>
+              </a:rPr>
+              <a:t>&lt;source&gt;</a:t>
+            </a:r>
+            <a:endParaRPr lang="en-US" sz="800" dirty="0">
+              <a:solidFill>
+                <a:srgbClr val="000000"/>
+              </a:solidFill>
+              <a:latin typeface="+mj-lt"/>
+            </a:endParaRPr>
+          </a:p>
+          <a:p>
+            <a:pPr marL="228600" indent="-228600">
+              <a:lnSpc>
+                <a:spcPct val="100000"/>
+              </a:lnSpc>
+              <a:buFont typeface="Arial" panose="020B0604020202020204" pitchFamily="34" charset="0"/>
+              <a:buAutoNum type="arabicPeriod"/>
+            </a:pPr>
+            <a:r>
+              <a:rPr lang="en-US" sz="800" b="0" i="0" dirty="0">
+                <a:solidFill>
+                  <a:srgbClr val="000000"/>
+                </a:solidFill>
+                <a:effectLst/>
+                <a:latin typeface="+mj-lt"/>
+              </a:rPr>
+              <a:t>&lt;source&gt;</a:t>
+            </a:r>
+            <a:endParaRPr lang="en-US" sz="800" dirty="0">
+              <a:solidFill>
+                <a:srgbClr val="000000"/>
+              </a:solidFill>
+              <a:latin typeface="+mj-lt"/>
+            </a:endParaRPr>
+          </a:p>
+          <a:p>
+            <a:pPr marL="228600" indent="-228600">
+              <a:lnSpc>
+                <a:spcPct val="100000"/>
+              </a:lnSpc>
+              <a:buFont typeface="Arial" panose="020B0604020202020204" pitchFamily="34" charset="0"/>
+              <a:buAutoNum type="arabicPeriod"/>
+            </a:pPr>
+            <a:r>
+              <a:rPr lang="en-US" sz="800" b="0" i="0" dirty="0">
+                <a:solidFill>
+                  <a:srgbClr val="000000"/>
+                </a:solidFill>
+                <a:effectLst/>
+                <a:latin typeface="+mj-lt"/>
+              </a:rPr>
+              <a:t>&lt;source&gt;</a:t>
+            </a:r>
+            <a:endParaRPr lang="en-US" sz="800" dirty="0">
+              <a:solidFill>
+                <a:srgbClr val="000000"/>
+              </a:solidFill>
+              <a:latin typeface="+mj-lt"/>
+            </a:endParaRPr>
+          </a:p>
+          <a:p>
+            <a:pPr marL="228600" indent="-228600">
+              <a:lnSpc>
+                <a:spcPct val="100000"/>
+              </a:lnSpc>
+              <a:buFont typeface="Arial" panose="020B0604020202020204" pitchFamily="34" charset="0"/>
+              <a:buAutoNum type="arabicPeriod"/>
+            </a:pPr>
+            <a:r>
+              <a:rPr lang="en-US" sz="800" b="0" i="0" dirty="0">
+                <a:solidFill>
+                  <a:srgbClr val="000000"/>
+                </a:solidFill>
+                <a:effectLst/>
+                <a:latin typeface="+mj-lt"/>
+              </a:rPr>
+              <a:t>&lt;source&gt;</a:t>
+            </a:r>
+            <a:endParaRPr lang="en-US" sz="800" dirty="0">
+              <a:solidFill>
+                <a:srgbClr val="000000"/>
+              </a:solidFill>
+              <a:latin typeface="+mj-lt"/>
+            </a:endParaRPr>
+          </a:p>
+          <a:p>
+            <a:pPr marL="228600" indent="-228600">
+              <a:lnSpc>
+                <a:spcPct val="100000"/>
+              </a:lnSpc>
+              <a:buFont typeface="Arial" panose="020B0604020202020204" pitchFamily="34" charset="0"/>
+              <a:buAutoNum type="arabicPeriod"/>
+            </a:pPr>
+            <a:r>
+              <a:rPr lang="en-US" sz="800" b="0" i="0" dirty="0">
+                <a:solidFill>
+                  <a:srgbClr val="000000"/>
+                </a:solidFill>
+                <a:effectLst/>
+                <a:latin typeface="+mj-lt"/>
+              </a:rPr>
+              <a:t>&lt;source&gt;</a:t>
+            </a:r>
+            <a:endParaRPr lang="en-US" sz="800" dirty="0">
+              <a:solidFill>
+                <a:srgbClr val="000000"/>
+              </a:solidFill>
+              <a:latin typeface="+mj-lt"/>
+            </a:endParaRPr>
+          </a:p>
+          <a:p>
+            <a:pPr marL="228600" indent="-228600">
+              <a:lnSpc>
+                <a:spcPct val="100000"/>
+              </a:lnSpc>
+              <a:buFont typeface="Arial" panose="020B0604020202020204" pitchFamily="34" charset="0"/>
+              <a:buAutoNum type="arabicPeriod"/>
+            </a:pPr>
+            <a:r>
+              <a:rPr lang="en-US" sz="800" b="0" i="0" dirty="0">
+                <a:solidFill>
+                  <a:srgbClr val="000000"/>
+                </a:solidFill>
+                <a:effectLst/>
+                <a:latin typeface="+mj-lt"/>
+              </a:rPr>
+              <a:t>&lt;source&gt;</a:t>
+            </a:r>
+            <a:endParaRPr lang="en-US" sz="800" dirty="0">
+              <a:solidFill>
+                <a:srgbClr val="000000"/>
+              </a:solidFill>
+              <a:latin typeface="+mj-lt"/>
+            </a:endParaRPr>
+          </a:p>
+          <a:p>
+            <a:pPr marL="228600" indent="-228600">
+              <a:lnSpc>
+                <a:spcPct val="100000"/>
+              </a:lnSpc>
+              <a:buFont typeface="Arial" panose="020B0604020202020204" pitchFamily="34" charset="0"/>
+              <a:buAutoNum type="arabicPeriod"/>
+            </a:pPr>
+            <a:r>
+              <a:rPr lang="en-US" sz="800" b="0" i="0" dirty="0">
+                <a:solidFill>
+                  <a:srgbClr val="000000"/>
+                </a:solidFill>
+                <a:effectLst/>
+                <a:latin typeface="+mj-lt"/>
+              </a:rPr>
+              <a:t>&lt;source&gt;</a:t>
+            </a:r>
+            <a:endParaRPr lang="en-US" sz="800" dirty="0">
+              <a:solidFill>
+                <a:srgbClr val="000000"/>
+              </a:solidFill>
+              <a:latin typeface="+mj-lt"/>
+            </a:endParaRPr>
+          </a:p>
+          <a:p>
+            <a:pPr marL="228600" indent="-228600">
+              <a:lnSpc>
+                <a:spcPct val="100000"/>
+              </a:lnSpc>
+              <a:buFont typeface="Arial" panose="020B0604020202020204" pitchFamily="34" charset="0"/>
+              <a:buAutoNum type="arabicPeriod"/>
+            </a:pPr>
+            <a:r>
+              <a:rPr lang="en-US" sz="800" b="0" i="0" dirty="0">
+                <a:solidFill>
+                  <a:srgbClr val="000000"/>
+                </a:solidFill>
+                <a:effectLst/>
+                <a:latin typeface="+mj-lt"/>
+              </a:rPr>
+              <a:t>&lt;source&gt;</a:t>
+            </a:r>
+            <a:endParaRPr lang="en-US" sz="800" dirty="0">
+              <a:solidFill>
+                <a:srgbClr val="000000"/>
+              </a:solidFill>
+              <a:latin typeface="+mj-lt"/>
+            </a:endParaRPr>
+          </a:p>
+          <a:p>
+            <a:pPr marL="228600" indent="-228600">
+              <a:lnSpc>
+                <a:spcPct val="100000"/>
+              </a:lnSpc>
+              <a:buFont typeface="Arial" panose="020B0604020202020204" pitchFamily="34" charset="0"/>
+              <a:buAutoNum type="arabicPeriod"/>
+            </a:pPr>
+            <a:r>
+              <a:rPr lang="en-US" sz="800" b="0" i="0" dirty="0">
+                <a:solidFill>
+                  <a:srgbClr val="000000"/>
+                </a:solidFill>
+                <a:effectLst/>
+                <a:latin typeface="+mj-lt"/>
+              </a:rPr>
+              <a:t>&lt;source&gt;</a:t>
+            </a:r>
+            <a:endParaRPr lang="en-US" sz="800" dirty="0">
+              <a:solidFill>
+                <a:srgbClr val="000000"/>
+              </a:solidFill>
+              <a:latin typeface="+mj-lt"/>
+            </a:endParaRPr>
+          </a:p>
+          <a:p>
+            <a:pPr marL="228600" indent="-228600">
+              <a:lnSpc>
+                <a:spcPct val="100000"/>
+              </a:lnSpc>
+              <a:buAutoNum type="arabicPeriod"/>
+            </a:pPr>
+            <a:r>
+              <a:rPr lang="en-US" sz="800" b="0" i="0" dirty="0">
+                <a:solidFill>
+                  <a:srgbClr val="000000"/>
+                </a:solidFill>
+                <a:effectLst/>
+                <a:latin typeface="+mj-lt"/>
+              </a:rPr>
+              <a:t>&lt;source&gt;</a:t>
+            </a:r>
+          </a:p>
+          <a:p>
+            <a:pPr marL="228600" indent="-228600">
+              <a:lnSpc>
+                <a:spcPct val="100000"/>
+              </a:lnSpc>
+              <a:buFont typeface="Arial" panose="020B0604020202020204" pitchFamily="34" charset="0"/>
+              <a:buAutoNum type="arabicPeriod"/>
+            </a:pPr>
+            <a:r>
+              <a:rPr lang="en-US" sz="800" b="0" i="0" dirty="0">
+                <a:solidFill>
+                  <a:srgbClr val="000000"/>
+                </a:solidFill>
+                <a:effectLst/>
+                <a:latin typeface="+mj-lt"/>
+              </a:rPr>
+              <a:t>&lt;source&gt;</a:t>
+            </a:r>
+            <a:endParaRPr lang="en-US" sz="800" dirty="0">
+              <a:solidFill>
+                <a:srgbClr val="000000"/>
+              </a:solidFill>
+              <a:latin typeface="+mj-lt"/>
+            </a:endParaRPr>
+          </a:p>
+          <a:p>
+            <a:pPr marL="228600" indent="-228600">
+              <a:lnSpc>
+                <a:spcPct val="100000"/>
+              </a:lnSpc>
+              <a:buFont typeface="Arial" panose="020B0604020202020204" pitchFamily="34" charset="0"/>
+              <a:buAutoNum type="arabicPeriod"/>
+            </a:pPr>
+            <a:r>
+              <a:rPr lang="en-US" sz="800" b="0" i="0" dirty="0">
+                <a:solidFill>
+                  <a:srgbClr val="000000"/>
+                </a:solidFill>
+                <a:effectLst/>
+                <a:latin typeface="+mj-lt"/>
+              </a:rPr>
+              <a:t>&lt;source&gt;</a:t>
+            </a:r>
+            <a:endParaRPr lang="en-US" sz="800" dirty="0">
+              <a:solidFill>
+                <a:srgbClr val="000000"/>
+              </a:solidFill>
+              <a:latin typeface="+mj-lt"/>
+            </a:endParaRPr>
+          </a:p>
+          <a:p>
+            <a:pPr marL="228600" indent="-228600">
+              <a:lnSpc>
+                <a:spcPct val="100000"/>
+              </a:lnSpc>
+              <a:buFont typeface="Arial" panose="020B0604020202020204" pitchFamily="34" charset="0"/>
+              <a:buAutoNum type="arabicPeriod"/>
+            </a:pPr>
+            <a:r>
+              <a:rPr lang="en-US" sz="800" b="0" i="0" dirty="0">
+                <a:solidFill>
+                  <a:srgbClr val="000000"/>
+                </a:solidFill>
+                <a:effectLst/>
+                <a:latin typeface="+mj-lt"/>
+              </a:rPr>
+              <a:t>&lt;source&gt;</a:t>
+            </a:r>
+            <a:endParaRPr lang="en-US" sz="800" dirty="0">
+              <a:solidFill>
+                <a:srgbClr val="000000"/>
+              </a:solidFill>
+              <a:latin typeface="+mj-lt"/>
+            </a:endParaRPr>
+          </a:p>
+          <a:p>
+            <a:pPr marL="228600" indent="-228600">
+              <a:lnSpc>
+                <a:spcPct val="100000"/>
+              </a:lnSpc>
+              <a:buFont typeface="Arial" panose="020B0604020202020204" pitchFamily="34" charset="0"/>
+              <a:buAutoNum type="arabicPeriod"/>
+            </a:pPr>
+            <a:r>
+              <a:rPr lang="en-US" sz="800" b="0" i="0" dirty="0">
+                <a:solidFill>
+                  <a:srgbClr val="000000"/>
+                </a:solidFill>
+                <a:effectLst/>
+                <a:latin typeface="+mj-lt"/>
+              </a:rPr>
+              <a:t>&lt;source&gt;</a:t>
+            </a:r>
+            <a:endParaRPr lang="en-US" sz="800" dirty="0">
+              <a:solidFill>
+                <a:srgbClr val="000000"/>
+              </a:solidFill>
+              <a:latin typeface="+mj-lt"/>
+            </a:endParaRPr>
+          </a:p>
+          <a:p>
+            <a:pPr marL="228600" indent="-228600">
+              <a:lnSpc>
+                <a:spcPct val="100000"/>
+              </a:lnSpc>
+              <a:buFont typeface="Arial" panose="020B0604020202020204" pitchFamily="34" charset="0"/>
+              <a:buAutoNum type="arabicPeriod"/>
+            </a:pPr>
+            <a:r>
+              <a:rPr lang="en-US" sz="800" b="0" i="0" dirty="0">
+                <a:solidFill>
+                  <a:srgbClr val="000000"/>
+                </a:solidFill>
+                <a:effectLst/>
+                <a:latin typeface="+mj-lt"/>
+              </a:rPr>
+              <a:t>&lt;source&gt;</a:t>
+            </a:r>
+            <a:endParaRPr lang="en-US" sz="800" dirty="0">
+              <a:solidFill>
+                <a:srgbClr val="000000"/>
+              </a:solidFill>
+              <a:latin typeface="+mj-lt"/>
+            </a:endParaRPr>
+          </a:p>
+          <a:p>
+            <a:pPr marL="228600" indent="-228600">
+              <a:lnSpc>
+                <a:spcPct val="100000"/>
+              </a:lnSpc>
+              <a:buFont typeface="Arial" panose="020B0604020202020204" pitchFamily="34" charset="0"/>
+              <a:buAutoNum type="arabicPeriod"/>
+            </a:pPr>
+            <a:r>
+              <a:rPr lang="en-US" sz="800" b="0" i="0" dirty="0">
+                <a:solidFill>
+                  <a:srgbClr val="000000"/>
+                </a:solidFill>
+                <a:effectLst/>
+                <a:latin typeface="+mj-lt"/>
+              </a:rPr>
+              <a:t>&lt;source&gt;</a:t>
+            </a:r>
+            <a:endParaRPr lang="en-US" sz="800" dirty="0">
+              <a:solidFill>
+                <a:srgbClr val="000000"/>
+              </a:solidFill>
+              <a:latin typeface="+mj-lt"/>
+            </a:endParaRPr>
+          </a:p>
+          <a:p>
+            <a:pPr marL="228600" indent="-228600">
+              <a:lnSpc>
+                <a:spcPct val="100000"/>
+              </a:lnSpc>
+              <a:buFont typeface="Arial" panose="020B0604020202020204" pitchFamily="34" charset="0"/>
+              <a:buAutoNum type="arabicPeriod"/>
+            </a:pPr>
+            <a:r>
+              <a:rPr lang="en-US" sz="800" b="0" i="0" dirty="0">
+                <a:solidFill>
+                  <a:srgbClr val="000000"/>
+                </a:solidFill>
+                <a:effectLst/>
+                <a:latin typeface="+mj-lt"/>
+              </a:rPr>
+              <a:t>&lt;source&gt;</a:t>
+            </a:r>
+            <a:endParaRPr lang="en-US" sz="800" dirty="0">
+              <a:solidFill>
+                <a:srgbClr val="000000"/>
+              </a:solidFill>
+              <a:latin typeface="+mj-lt"/>
+            </a:endParaRPr>
+          </a:p>
+          <a:p>
+            <a:pPr marL="228600" indent="-228600">
+              <a:lnSpc>
+                <a:spcPct val="100000"/>
+              </a:lnSpc>
+              <a:buFont typeface="Arial" panose="020B0604020202020204" pitchFamily="34" charset="0"/>
+              <a:buAutoNum type="arabicPeriod"/>
+            </a:pPr>
+            <a:r>
+              <a:rPr lang="en-US" sz="800" b="0" i="0" dirty="0">
+                <a:solidFill>
+                  <a:srgbClr val="000000"/>
+                </a:solidFill>
+                <a:effectLst/>
+                <a:latin typeface="+mj-lt"/>
+              </a:rPr>
+              <a:t>&lt;source&gt;</a:t>
+            </a:r>
+            <a:endParaRPr lang="en-US" sz="800" dirty="0">
+              <a:solidFill>
+                <a:srgbClr val="000000"/>
+              </a:solidFill>
+              <a:latin typeface="+mj-lt"/>
+            </a:endParaRPr>
+          </a:p>
+          <a:p>
+            <a:pPr marL="228600" indent="-228600">
+              <a:lnSpc>
+                <a:spcPct val="100000"/>
+              </a:lnSpc>
+              <a:buFont typeface="Arial" panose="020B0604020202020204" pitchFamily="34" charset="0"/>
+              <a:buAutoNum type="arabicPeriod"/>
+            </a:pPr>
+            <a:r>
+              <a:rPr lang="en-US" sz="800" b="0" i="0" dirty="0">
+                <a:solidFill>
+                  <a:srgbClr val="000000"/>
+                </a:solidFill>
+                <a:effectLst/>
+                <a:latin typeface="+mj-lt"/>
+              </a:rPr>
+              <a:t>&lt;source&gt;</a:t>
+            </a:r>
+            <a:endParaRPr lang="en-US" sz="800" dirty="0">
+              <a:solidFill>
+                <a:srgbClr val="000000"/>
+              </a:solidFill>
+              <a:latin typeface="+mj-lt"/>
+            </a:endParaRPr>
+          </a:p>
+          <a:p>
+            <a:pPr marL="228600" indent="-228600">
+              <a:lnSpc>
+                <a:spcPct val="100000"/>
+              </a:lnSpc>
+              <a:buAutoNum type="arabicPeriod"/>
+            </a:pPr>
+            <a:endParaRPr lang="en-US" sz="800" dirty="0">
+              <a:solidFill>
+                <a:srgbClr val="000000"/>
+              </a:solidFill>
+              <a:latin typeface="+mj-lt"/>
+            </a:endParaRPr>
           </a:p>
         </p:txBody>
       </p:sp>
     </p:spTree>
     <p:extLst>
       <p:ext uri="{BB962C8B-B14F-4D97-AF65-F5344CB8AC3E}">
-        <p14:creationId xmlns:p14="http://schemas.microsoft.com/office/powerpoint/2010/main" val="2707958192"/>
+        <p14:creationId xmlns:p14="http://schemas.microsoft.com/office/powerpoint/2010/main" val="3979554754"/>
       </p:ext>
     </p:extLst>
   </p:cSld>
@@ -2381,6 +3826,12 @@
 <file path=ppt/tags/tag2.xml><?xml version="1.0" encoding="utf-8"?>
 <p:tagLst xmlns:a="http://schemas.openxmlformats.org/drawingml/2006/main" xmlns:r="http://schemas.openxmlformats.org/officeDocument/2006/relationships" xmlns:p="http://schemas.openxmlformats.org/presentationml/2006/main">
   <p:tag name="NUM" val="4"/>
+</p:tagLst>
+</file>
+
+<file path=ppt/tags/tag3.xml><?xml version="1.0" encoding="utf-8"?>
+<p:tagLst xmlns:a="http://schemas.openxmlformats.org/drawingml/2006/main" xmlns:r="http://schemas.openxmlformats.org/officeDocument/2006/relationships" xmlns:p="http://schemas.openxmlformats.org/presentationml/2006/main">
+  <p:tag name="NUM" val="2"/>
 </p:tagLst>
 </file>
 
@@ -2666,6 +4117,26 @@
 </file>
 
 <file path=customXml/item1.xml><?xml version="1.0" encoding="utf-8"?>
+<?mso-contentType ?>
+<FormTemplates xmlns="http://schemas.microsoft.com/sharepoint/v3/contenttype/forms">
+  <Display>DocumentLibraryForm</Display>
+  <Edit>DocumentLibraryForm</Edit>
+  <New>DocumentLibraryForm</New>
+</FormTemplates>
+</file>
+
+<file path=customXml/item2.xml><?xml version="1.0" encoding="utf-8"?>
+<p:properties xmlns:p="http://schemas.microsoft.com/office/2006/metadata/properties" xmlns:xsi="http://www.w3.org/2001/XMLSchema-instance" xmlns:pc="http://schemas.microsoft.com/office/infopath/2007/PartnerControls">
+  <documentManagement>
+    <lcf76f155ced4ddcb4097134ff3c332f xmlns="81c9f6d7-38be-4b6f-ac7a-53278e4778cd">
+      <Terms xmlns="http://schemas.microsoft.com/office/infopath/2007/PartnerControls"/>
+    </lcf76f155ced4ddcb4097134ff3c332f>
+    <TaxCatchAll xmlns="562370e7-b28b-48b8-b232-8034dde365ed" xsi:nil="true"/>
+  </documentManagement>
+</p:properties>
+</file>
+
+<file path=customXml/item3.xml><?xml version="1.0" encoding="utf-8"?>
 <ct:contentTypeSchema xmlns:ct="http://schemas.microsoft.com/office/2006/metadata/contentType" xmlns:ma="http://schemas.microsoft.com/office/2006/metadata/properties/metaAttributes" ct:_="" ma:_="" ma:contentTypeName="Document" ma:contentTypeID="0x010100502947A9A1BFB64E940A6360D3C2E9FF" ma:contentTypeVersion="15" ma:contentTypeDescription="Crée un document." ma:contentTypeScope="" ma:versionID="ab003bcfa122b52dea7dac2dc4c56070">
   <xsd:schema xmlns:xsd="http://www.w3.org/2001/XMLSchema" xmlns:xs="http://www.w3.org/2001/XMLSchema" xmlns:p="http://schemas.microsoft.com/office/2006/metadata/properties" xmlns:ns2="81c9f6d7-38be-4b6f-ac7a-53278e4778cd" xmlns:ns3="562370e7-b28b-48b8-b232-8034dde365ed" targetNamespace="http://schemas.microsoft.com/office/2006/metadata/properties" ma:root="true" ma:fieldsID="55310cbb28621703c25a0ab43cf87825" ns2:_="" ns3:_="">
     <xsd:import namespace="81c9f6d7-38be-4b6f-ac7a-53278e4778cd"/>
@@ -2902,41 +4373,10 @@
 </ct:contentTypeSchema>
 </file>
 
-<file path=customXml/item2.xml><?xml version="1.0" encoding="utf-8"?>
-<p:properties xmlns:p="http://schemas.microsoft.com/office/2006/metadata/properties" xmlns:xsi="http://www.w3.org/2001/XMLSchema-instance" xmlns:pc="http://schemas.microsoft.com/office/infopath/2007/PartnerControls">
-  <documentManagement>
-    <lcf76f155ced4ddcb4097134ff3c332f xmlns="81c9f6d7-38be-4b6f-ac7a-53278e4778cd">
-      <Terms xmlns="http://schemas.microsoft.com/office/infopath/2007/PartnerControls"/>
-    </lcf76f155ced4ddcb4097134ff3c332f>
-    <TaxCatchAll xmlns="562370e7-b28b-48b8-b232-8034dde365ed" xsi:nil="true"/>
-  </documentManagement>
-</p:properties>
-</file>
-
-<file path=customXml/item3.xml><?xml version="1.0" encoding="utf-8"?>
-<?mso-contentType ?>
-<FormTemplates xmlns="http://schemas.microsoft.com/sharepoint/v3/contenttype/forms">
-  <Display>DocumentLibraryForm</Display>
-  <Edit>DocumentLibraryForm</Edit>
-  <New>DocumentLibraryForm</New>
-</FormTemplates>
-</file>
-
 <file path=customXml/itemProps1.xml><?xml version="1.0" encoding="utf-8"?>
-<ds:datastoreItem xmlns:ds="http://schemas.openxmlformats.org/officeDocument/2006/customXml" ds:itemID="{11065811-FE0D-4D15-8CA7-D9C0C1B9452F}">
+<ds:datastoreItem xmlns:ds="http://schemas.openxmlformats.org/officeDocument/2006/customXml" ds:itemID="{4E8F74D5-47AA-4DAD-A3A5-90C8113106BE}">
   <ds:schemaRefs>
-    <ds:schemaRef ds:uri="http://schemas.microsoft.com/office/2006/metadata/contentType"/>
-    <ds:schemaRef ds:uri="http://schemas.microsoft.com/office/2006/metadata/properties/metaAttributes"/>
-    <ds:schemaRef ds:uri="http://www.w3.org/2001/XMLSchema"/>
-    <ds:schemaRef ds:uri="http://schemas.microsoft.com/office/2006/metadata/properties"/>
-    <ds:schemaRef ds:uri="81c9f6d7-38be-4b6f-ac7a-53278e4778cd"/>
-    <ds:schemaRef ds:uri="562370e7-b28b-48b8-b232-8034dde365ed"/>
-    <ds:schemaRef ds:uri="http://schemas.microsoft.com/office/2006/documentManagement/types"/>
-    <ds:schemaRef ds:uri="http://schemas.microsoft.com/office/infopath/2007/PartnerControls"/>
-    <ds:schemaRef ds:uri="http://schemas.openxmlformats.org/package/2006/metadata/core-properties"/>
-    <ds:schemaRef ds:uri="http://purl.org/dc/elements/1.1/"/>
-    <ds:schemaRef ds:uri="http://purl.org/dc/terms/"/>
-    <ds:schemaRef ds:uri="http://schemas.microsoft.com/internal/obd"/>
+    <ds:schemaRef ds:uri="http://schemas.microsoft.com/sharepoint/v3/contenttype/forms"/>
   </ds:schemaRefs>
 </ds:datastoreItem>
 </file>
@@ -2959,9 +4399,20 @@
 </file>
 
 <file path=customXml/itemProps3.xml><?xml version="1.0" encoding="utf-8"?>
-<ds:datastoreItem xmlns:ds="http://schemas.openxmlformats.org/officeDocument/2006/customXml" ds:itemID="{4E8F74D5-47AA-4DAD-A3A5-90C8113106BE}">
+<ds:datastoreItem xmlns:ds="http://schemas.openxmlformats.org/officeDocument/2006/customXml" ds:itemID="{11065811-FE0D-4D15-8CA7-D9C0C1B9452F}">
   <ds:schemaRefs>
-    <ds:schemaRef ds:uri="http://schemas.microsoft.com/sharepoint/v3/contenttype/forms"/>
+    <ds:schemaRef ds:uri="http://schemas.microsoft.com/office/2006/metadata/contentType"/>
+    <ds:schemaRef ds:uri="http://schemas.microsoft.com/office/2006/metadata/properties/metaAttributes"/>
+    <ds:schemaRef ds:uri="http://www.w3.org/2001/XMLSchema"/>
+    <ds:schemaRef ds:uri="http://schemas.microsoft.com/office/2006/metadata/properties"/>
+    <ds:schemaRef ds:uri="81c9f6d7-38be-4b6f-ac7a-53278e4778cd"/>
+    <ds:schemaRef ds:uri="562370e7-b28b-48b8-b232-8034dde365ed"/>
+    <ds:schemaRef ds:uri="http://schemas.microsoft.com/office/2006/documentManagement/types"/>
+    <ds:schemaRef ds:uri="http://schemas.microsoft.com/office/infopath/2007/PartnerControls"/>
+    <ds:schemaRef ds:uri="http://schemas.openxmlformats.org/package/2006/metadata/core-properties"/>
+    <ds:schemaRef ds:uri="http://purl.org/dc/elements/1.1/"/>
+    <ds:schemaRef ds:uri="http://purl.org/dc/terms/"/>
+    <ds:schemaRef ds:uri="http://schemas.microsoft.com/internal/obd"/>
   </ds:schemaRefs>
 </ds:datastoreItem>
 </file>
</xml_diff>

<commit_message>
adapt to new gabarit
</commit_message>
<xml_diff>
--- a/powerpoints/gabarit_mod.pptx
+++ b/powerpoints/gabarit_mod.pptx
@@ -232,7 +232,7 @@
             <a:fld id="{FDCA904F-AFE4-4F4A-AA13-CC2FD407ABB0}" type="datetimeFigureOut">
               <a:rPr lang="fr-CA" smtClean="0"/>
               <a:pPr/>
-              <a:t>2023-07-09</a:t>
+              <a:t>2023-07-12</a:t>
             </a:fld>
             <a:endParaRPr lang="fr-CA" dirty="0"/>
           </a:p>
@@ -1616,7 +1616,7 @@
             <a:fld id="{FDCA904F-AFE4-4F4A-AA13-CC2FD407ABB0}" type="datetimeFigureOut">
               <a:rPr lang="fr-CA" smtClean="0"/>
               <a:pPr/>
-              <a:t>2023-07-09</a:t>
+              <a:t>2023-07-12</a:t>
             </a:fld>
             <a:endParaRPr lang="fr-CA" dirty="0"/>
           </a:p>
@@ -4117,26 +4117,6 @@
 </file>
 
 <file path=customXml/item1.xml><?xml version="1.0" encoding="utf-8"?>
-<?mso-contentType ?>
-<FormTemplates xmlns="http://schemas.microsoft.com/sharepoint/v3/contenttype/forms">
-  <Display>DocumentLibraryForm</Display>
-  <Edit>DocumentLibraryForm</Edit>
-  <New>DocumentLibraryForm</New>
-</FormTemplates>
-</file>
-
-<file path=customXml/item2.xml><?xml version="1.0" encoding="utf-8"?>
-<p:properties xmlns:p="http://schemas.microsoft.com/office/2006/metadata/properties" xmlns:xsi="http://www.w3.org/2001/XMLSchema-instance" xmlns:pc="http://schemas.microsoft.com/office/infopath/2007/PartnerControls">
-  <documentManagement>
-    <lcf76f155ced4ddcb4097134ff3c332f xmlns="81c9f6d7-38be-4b6f-ac7a-53278e4778cd">
-      <Terms xmlns="http://schemas.microsoft.com/office/infopath/2007/PartnerControls"/>
-    </lcf76f155ced4ddcb4097134ff3c332f>
-    <TaxCatchAll xmlns="562370e7-b28b-48b8-b232-8034dde365ed" xsi:nil="true"/>
-  </documentManagement>
-</p:properties>
-</file>
-
-<file path=customXml/item3.xml><?xml version="1.0" encoding="utf-8"?>
 <ct:contentTypeSchema xmlns:ct="http://schemas.microsoft.com/office/2006/metadata/contentType" xmlns:ma="http://schemas.microsoft.com/office/2006/metadata/properties/metaAttributes" ct:_="" ma:_="" ma:contentTypeName="Document" ma:contentTypeID="0x010100502947A9A1BFB64E940A6360D3C2E9FF" ma:contentTypeVersion="15" ma:contentTypeDescription="Crée un document." ma:contentTypeScope="" ma:versionID="ab003bcfa122b52dea7dac2dc4c56070">
   <xsd:schema xmlns:xsd="http://www.w3.org/2001/XMLSchema" xmlns:xs="http://www.w3.org/2001/XMLSchema" xmlns:p="http://schemas.microsoft.com/office/2006/metadata/properties" xmlns:ns2="81c9f6d7-38be-4b6f-ac7a-53278e4778cd" xmlns:ns3="562370e7-b28b-48b8-b232-8034dde365ed" targetNamespace="http://schemas.microsoft.com/office/2006/metadata/properties" ma:root="true" ma:fieldsID="55310cbb28621703c25a0ab43cf87825" ns2:_="" ns3:_="">
     <xsd:import namespace="81c9f6d7-38be-4b6f-ac7a-53278e4778cd"/>
@@ -4373,10 +4353,41 @@
 </ct:contentTypeSchema>
 </file>
 
+<file path=customXml/item2.xml><?xml version="1.0" encoding="utf-8"?>
+<p:properties xmlns:p="http://schemas.microsoft.com/office/2006/metadata/properties" xmlns:xsi="http://www.w3.org/2001/XMLSchema-instance" xmlns:pc="http://schemas.microsoft.com/office/infopath/2007/PartnerControls">
+  <documentManagement>
+    <lcf76f155ced4ddcb4097134ff3c332f xmlns="81c9f6d7-38be-4b6f-ac7a-53278e4778cd">
+      <Terms xmlns="http://schemas.microsoft.com/office/infopath/2007/PartnerControls"/>
+    </lcf76f155ced4ddcb4097134ff3c332f>
+    <TaxCatchAll xmlns="562370e7-b28b-48b8-b232-8034dde365ed" xsi:nil="true"/>
+  </documentManagement>
+</p:properties>
+</file>
+
+<file path=customXml/item3.xml><?xml version="1.0" encoding="utf-8"?>
+<?mso-contentType ?>
+<FormTemplates xmlns="http://schemas.microsoft.com/sharepoint/v3/contenttype/forms">
+  <Display>DocumentLibraryForm</Display>
+  <Edit>DocumentLibraryForm</Edit>
+  <New>DocumentLibraryForm</New>
+</FormTemplates>
+</file>
+
 <file path=customXml/itemProps1.xml><?xml version="1.0" encoding="utf-8"?>
-<ds:datastoreItem xmlns:ds="http://schemas.openxmlformats.org/officeDocument/2006/customXml" ds:itemID="{4E8F74D5-47AA-4DAD-A3A5-90C8113106BE}">
+<ds:datastoreItem xmlns:ds="http://schemas.openxmlformats.org/officeDocument/2006/customXml" ds:itemID="{11065811-FE0D-4D15-8CA7-D9C0C1B9452F}">
   <ds:schemaRefs>
-    <ds:schemaRef ds:uri="http://schemas.microsoft.com/sharepoint/v3/contenttype/forms"/>
+    <ds:schemaRef ds:uri="http://schemas.microsoft.com/office/2006/metadata/contentType"/>
+    <ds:schemaRef ds:uri="http://schemas.microsoft.com/office/2006/metadata/properties/metaAttributes"/>
+    <ds:schemaRef ds:uri="http://www.w3.org/2001/XMLSchema"/>
+    <ds:schemaRef ds:uri="http://schemas.microsoft.com/office/2006/metadata/properties"/>
+    <ds:schemaRef ds:uri="81c9f6d7-38be-4b6f-ac7a-53278e4778cd"/>
+    <ds:schemaRef ds:uri="562370e7-b28b-48b8-b232-8034dde365ed"/>
+    <ds:schemaRef ds:uri="http://schemas.microsoft.com/office/2006/documentManagement/types"/>
+    <ds:schemaRef ds:uri="http://schemas.microsoft.com/office/infopath/2007/PartnerControls"/>
+    <ds:schemaRef ds:uri="http://schemas.openxmlformats.org/package/2006/metadata/core-properties"/>
+    <ds:schemaRef ds:uri="http://purl.org/dc/elements/1.1/"/>
+    <ds:schemaRef ds:uri="http://purl.org/dc/terms/"/>
+    <ds:schemaRef ds:uri="http://schemas.microsoft.com/internal/obd"/>
   </ds:schemaRefs>
 </ds:datastoreItem>
 </file>
@@ -4399,20 +4410,9 @@
 </file>
 
 <file path=customXml/itemProps3.xml><?xml version="1.0" encoding="utf-8"?>
-<ds:datastoreItem xmlns:ds="http://schemas.openxmlformats.org/officeDocument/2006/customXml" ds:itemID="{11065811-FE0D-4D15-8CA7-D9C0C1B9452F}">
+<ds:datastoreItem xmlns:ds="http://schemas.openxmlformats.org/officeDocument/2006/customXml" ds:itemID="{4E8F74D5-47AA-4DAD-A3A5-90C8113106BE}">
   <ds:schemaRefs>
-    <ds:schemaRef ds:uri="http://schemas.microsoft.com/office/2006/metadata/contentType"/>
-    <ds:schemaRef ds:uri="http://schemas.microsoft.com/office/2006/metadata/properties/metaAttributes"/>
-    <ds:schemaRef ds:uri="http://www.w3.org/2001/XMLSchema"/>
-    <ds:schemaRef ds:uri="http://schemas.microsoft.com/office/2006/metadata/properties"/>
-    <ds:schemaRef ds:uri="81c9f6d7-38be-4b6f-ac7a-53278e4778cd"/>
-    <ds:schemaRef ds:uri="562370e7-b28b-48b8-b232-8034dde365ed"/>
-    <ds:schemaRef ds:uri="http://schemas.microsoft.com/office/2006/documentManagement/types"/>
-    <ds:schemaRef ds:uri="http://schemas.microsoft.com/office/infopath/2007/PartnerControls"/>
-    <ds:schemaRef ds:uri="http://schemas.openxmlformats.org/package/2006/metadata/core-properties"/>
-    <ds:schemaRef ds:uri="http://purl.org/dc/elements/1.1/"/>
-    <ds:schemaRef ds:uri="http://purl.org/dc/terms/"/>
-    <ds:schemaRef ds:uri="http://schemas.microsoft.com/internal/obd"/>
+    <ds:schemaRef ds:uri="http://schemas.microsoft.com/sharepoint/v3/contenttype/forms"/>
   </ds:schemaRefs>
 </ds:datastoreItem>
 </file>
</xml_diff>